<commit_message>
languageselector closes when tapped outside
</commit_message>
<xml_diff>
--- a/design.pptx
+++ b/design.pptx
@@ -8,6 +8,7 @@
     <p:sldId id="256" r:id="rId2"/>
     <p:sldId id="258" r:id="rId3"/>
     <p:sldId id="257" r:id="rId4"/>
+    <p:sldId id="259" r:id="rId5"/>
   </p:sldIdLst>
   <p:sldSz cx="12192000" cy="6858000"/>
   <p:notesSz cx="6858000" cy="9144000"/>
@@ -260,7 +261,7 @@
           <a:lstStyle/>
           <a:p>
             <a:fld id="{D1DAA325-DE4D-914A-9FAA-B3B24EE0409A}" type="datetimeFigureOut">
-              <a:t>11/1/24</a:t>
+              <a:t>11/3/24</a:t>
             </a:fld>
             <a:endParaRPr lang="en-US"/>
           </a:p>
@@ -456,7 +457,7 @@
           <a:lstStyle/>
           <a:p>
             <a:fld id="{D1DAA325-DE4D-914A-9FAA-B3B24EE0409A}" type="datetimeFigureOut">
-              <a:t>11/1/24</a:t>
+              <a:t>11/3/24</a:t>
             </a:fld>
             <a:endParaRPr lang="en-US"/>
           </a:p>
@@ -662,7 +663,7 @@
           <a:lstStyle/>
           <a:p>
             <a:fld id="{D1DAA325-DE4D-914A-9FAA-B3B24EE0409A}" type="datetimeFigureOut">
-              <a:t>11/1/24</a:t>
+              <a:t>11/3/24</a:t>
             </a:fld>
             <a:endParaRPr lang="en-US"/>
           </a:p>
@@ -858,7 +859,7 @@
           <a:lstStyle/>
           <a:p>
             <a:fld id="{D1DAA325-DE4D-914A-9FAA-B3B24EE0409A}" type="datetimeFigureOut">
-              <a:t>11/1/24</a:t>
+              <a:t>11/3/24</a:t>
             </a:fld>
             <a:endParaRPr lang="en-US"/>
           </a:p>
@@ -1131,7 +1132,7 @@
           <a:lstStyle/>
           <a:p>
             <a:fld id="{D1DAA325-DE4D-914A-9FAA-B3B24EE0409A}" type="datetimeFigureOut">
-              <a:t>11/1/24</a:t>
+              <a:t>11/3/24</a:t>
             </a:fld>
             <a:endParaRPr lang="en-US"/>
           </a:p>
@@ -1394,7 +1395,7 @@
           <a:lstStyle/>
           <a:p>
             <a:fld id="{D1DAA325-DE4D-914A-9FAA-B3B24EE0409A}" type="datetimeFigureOut">
-              <a:t>11/1/24</a:t>
+              <a:t>11/3/24</a:t>
             </a:fld>
             <a:endParaRPr lang="en-US"/>
           </a:p>
@@ -1804,7 +1805,7 @@
           <a:lstStyle/>
           <a:p>
             <a:fld id="{D1DAA325-DE4D-914A-9FAA-B3B24EE0409A}" type="datetimeFigureOut">
-              <a:t>11/1/24</a:t>
+              <a:t>11/3/24</a:t>
             </a:fld>
             <a:endParaRPr lang="en-US"/>
           </a:p>
@@ -1943,7 +1944,7 @@
           <a:lstStyle/>
           <a:p>
             <a:fld id="{D1DAA325-DE4D-914A-9FAA-B3B24EE0409A}" type="datetimeFigureOut">
-              <a:t>11/1/24</a:t>
+              <a:t>11/3/24</a:t>
             </a:fld>
             <a:endParaRPr lang="en-US"/>
           </a:p>
@@ -2054,7 +2055,7 @@
           <a:lstStyle/>
           <a:p>
             <a:fld id="{D1DAA325-DE4D-914A-9FAA-B3B24EE0409A}" type="datetimeFigureOut">
-              <a:t>11/1/24</a:t>
+              <a:t>11/3/24</a:t>
             </a:fld>
             <a:endParaRPr lang="en-US"/>
           </a:p>
@@ -2363,7 +2364,7 @@
           <a:lstStyle/>
           <a:p>
             <a:fld id="{D1DAA325-DE4D-914A-9FAA-B3B24EE0409A}" type="datetimeFigureOut">
-              <a:t>11/1/24</a:t>
+              <a:t>11/3/24</a:t>
             </a:fld>
             <a:endParaRPr lang="en-US"/>
           </a:p>
@@ -2649,7 +2650,7 @@
           <a:lstStyle/>
           <a:p>
             <a:fld id="{D1DAA325-DE4D-914A-9FAA-B3B24EE0409A}" type="datetimeFigureOut">
-              <a:t>11/1/24</a:t>
+              <a:t>11/3/24</a:t>
             </a:fld>
             <a:endParaRPr lang="en-US"/>
           </a:p>
@@ -2888,7 +2889,7 @@
           </a:lstStyle>
           <a:p>
             <a:fld id="{D1DAA325-DE4D-914A-9FAA-B3B24EE0409A}" type="datetimeFigureOut">
-              <a:t>11/1/24</a:t>
+              <a:t>11/3/24</a:t>
             </a:fld>
             <a:endParaRPr lang="en-US"/>
           </a:p>
@@ -3368,6 +3369,36 @@
           </a:prstGeom>
         </p:spPr>
       </p:pic>
+      <p:pic>
+        <p:nvPicPr>
+          <p:cNvPr id="3" name="Picture 2">
+            <a:extLst>
+              <a:ext uri="{FF2B5EF4-FFF2-40B4-BE49-F238E27FC236}">
+                <a16:creationId xmlns:a16="http://schemas.microsoft.com/office/drawing/2014/main" id="{16F5B56F-E641-B0DF-52D5-98600CE3E524}"/>
+              </a:ext>
+            </a:extLst>
+          </p:cNvPr>
+          <p:cNvPicPr>
+            <a:picLocks noChangeAspect="1"/>
+          </p:cNvPicPr>
+          <p:nvPr/>
+        </p:nvPicPr>
+        <p:blipFill>
+          <a:blip r:embed="rId4"/>
+          <a:stretch>
+            <a:fillRect/>
+          </a:stretch>
+        </p:blipFill>
+        <p:spPr>
+          <a:xfrm>
+            <a:off x="7886384" y="0"/>
+            <a:ext cx="3160690" cy="6858000"/>
+          </a:xfrm>
+          <a:prstGeom prst="rect">
+            <a:avLst/>
+          </a:prstGeom>
+        </p:spPr>
+      </p:pic>
     </p:spTree>
     <p:extLst>
       <p:ext uri="{BB962C8B-B14F-4D97-AF65-F5344CB8AC3E}">
@@ -4051,6 +4082,66 @@
     <p:extLst>
       <p:ext uri="{BB962C8B-B14F-4D97-AF65-F5344CB8AC3E}">
         <p14:creationId xmlns:p14="http://schemas.microsoft.com/office/powerpoint/2010/main" val="920664423"/>
+      </p:ext>
+    </p:extLst>
+  </p:cSld>
+  <p:clrMapOvr>
+    <a:masterClrMapping/>
+  </p:clrMapOvr>
+</p:sld>
+</file>
+
+<file path=ppt/slides/slide4.xml><?xml version="1.0" encoding="utf-8"?>
+<p:sld xmlns:a="http://schemas.openxmlformats.org/drawingml/2006/main" xmlns:r="http://schemas.openxmlformats.org/officeDocument/2006/relationships" xmlns:p="http://schemas.openxmlformats.org/presentationml/2006/main">
+  <p:cSld>
+    <p:spTree>
+      <p:nvGrpSpPr>
+        <p:cNvPr id="1" name=""/>
+        <p:cNvGrpSpPr/>
+        <p:nvPr/>
+      </p:nvGrpSpPr>
+      <p:grpSpPr>
+        <a:xfrm>
+          <a:off x="0" y="0"/>
+          <a:ext cx="0" cy="0"/>
+          <a:chOff x="0" y="0"/>
+          <a:chExt cx="0" cy="0"/>
+        </a:xfrm>
+      </p:grpSpPr>
+      <p:pic>
+        <p:nvPicPr>
+          <p:cNvPr id="3" name="Picture 2">
+            <a:extLst>
+              <a:ext uri="{FF2B5EF4-FFF2-40B4-BE49-F238E27FC236}">
+                <a16:creationId xmlns:a16="http://schemas.microsoft.com/office/drawing/2014/main" id="{16F5B56F-E641-B0DF-52D5-98600CE3E524}"/>
+              </a:ext>
+            </a:extLst>
+          </p:cNvPr>
+          <p:cNvPicPr>
+            <a:picLocks noChangeAspect="1"/>
+          </p:cNvPicPr>
+          <p:nvPr/>
+        </p:nvPicPr>
+        <p:blipFill>
+          <a:blip r:embed="rId2"/>
+          <a:stretch>
+            <a:fillRect/>
+          </a:stretch>
+        </p:blipFill>
+        <p:spPr>
+          <a:xfrm>
+            <a:off x="7886384" y="0"/>
+            <a:ext cx="3160690" cy="6858000"/>
+          </a:xfrm>
+          <a:prstGeom prst="rect">
+            <a:avLst/>
+          </a:prstGeom>
+        </p:spPr>
+      </p:pic>
+    </p:spTree>
+    <p:extLst>
+      <p:ext uri="{BB962C8B-B14F-4D97-AF65-F5344CB8AC3E}">
+        <p14:creationId xmlns:p14="http://schemas.microsoft.com/office/powerpoint/2010/main" val="4034960808"/>
       </p:ext>
     </p:extLst>
   </p:cSld>

</xml_diff>